<commit_message>
Fixed a slight bug in the example slide.
</commit_message>
<xml_diff>
--- a/powerpoint/basic_concepts.pptx
+++ b/powerpoint/basic_concepts.pptx
@@ -130,14 +130,6 @@
     </p:extLst>
   </p:cmAuthor>
 </p:cmAuthorLst>
-</file>
-
-<file path=ppt/revisionInfo.xml><?xml version="1.0" encoding="utf-8"?>
-<p1510:revInfo xmlns:a="http://schemas.openxmlformats.org/drawingml/2006/main" xmlns:r="http://schemas.openxmlformats.org/officeDocument/2006/relationships" xmlns:p1510="http://schemas.microsoft.com/office/powerpoint/2015/10/main">
-  <p1510:revLst>
-    <p1510:client id="{6784E449-7B13-4969-BAD0-50A863137985}" v="3481" dt="2023-12-23T08:15:59.932"/>
-  </p1510:revLst>
-</p1510:revInfo>
 </file>
 
 <file path=ppt/notesMasters/notesMaster1.xml><?xml version="1.0" encoding="utf-8"?>
@@ -7859,7 +7851,7 @@
               <a:t> </a:t>
             </a:r>
             <a:r>
-              <a:rPr lang="en-US" sz="1600" b="0" dirty="0">
+              <a:rPr lang="en-US" sz="1600" b="0">
                 <a:solidFill>
                   <a:srgbClr val="D4D4D4"/>
                 </a:solidFill>
@@ -7869,7 +7861,7 @@
               <a:t>=</a:t>
             </a:r>
             <a:r>
-              <a:rPr lang="en-US" sz="1600" b="0" dirty="0">
+              <a:rPr lang="en-US" sz="1600" b="0">
                 <a:solidFill>
                   <a:srgbClr val="CCCCCC"/>
                 </a:solidFill>
@@ -7879,14 +7871,13 @@
               <a:t> </a:t>
             </a:r>
             <a:r>
-              <a:rPr lang="en-US" sz="1600" b="0" dirty="0">
+              <a:rPr lang="en-US" sz="1600" dirty="0">
                 <a:solidFill>
                   <a:srgbClr val="B5CEA8"/>
                 </a:solidFill>
-                <a:effectLst/>
-                <a:latin typeface="Consolas" panose="020B0609020204030204" pitchFamily="49" charset="0"/>
-              </a:rPr>
-              <a:t>3</a:t>
+                <a:latin typeface="Consolas" panose="020B0609020204030204" pitchFamily="49" charset="0"/>
+              </a:rPr>
+              <a:t>2</a:t>
             </a:r>
             <a:endParaRPr lang="en-US" sz="1600" b="0" dirty="0">
               <a:solidFill>

</xml_diff>